<commit_message>
the code is working. I changed the GDB script so the output is correct.
</commit_message>
<xml_diff>
--- a/analog ready and triger.pptx
+++ b/analog ready and triger.pptx
@@ -14,6 +14,7 @@
     <p:sldId id="262" r:id="rId8"/>
     <p:sldId id="263" r:id="rId9"/>
     <p:sldId id="264" r:id="rId10"/>
+    <p:sldId id="265" r:id="rId11"/>
   </p:sldIdLst>
   <p:sldSz cx="12192000" cy="6858000"/>
   <p:notesSz cx="6858000" cy="9144000"/>
@@ -269,7 +270,7 @@
           <a:p>
             <a:fld id="{369ECE3D-5579-42B5-BBD4-D71CCDF0049C}" type="datetimeFigureOut">
               <a:rPr lang="en-GB" smtClean="0"/>
-              <a:t>17/10/2022</a:t>
+              <a:t>20/10/2022</a:t>
             </a:fld>
             <a:endParaRPr lang="en-GB"/>
           </a:p>
@@ -469,7 +470,7 @@
           <a:p>
             <a:fld id="{369ECE3D-5579-42B5-BBD4-D71CCDF0049C}" type="datetimeFigureOut">
               <a:rPr lang="en-GB" smtClean="0"/>
-              <a:t>17/10/2022</a:t>
+              <a:t>20/10/2022</a:t>
             </a:fld>
             <a:endParaRPr lang="en-GB"/>
           </a:p>
@@ -679,7 +680,7 @@
           <a:p>
             <a:fld id="{369ECE3D-5579-42B5-BBD4-D71CCDF0049C}" type="datetimeFigureOut">
               <a:rPr lang="en-GB" smtClean="0"/>
-              <a:t>17/10/2022</a:t>
+              <a:t>20/10/2022</a:t>
             </a:fld>
             <a:endParaRPr lang="en-GB"/>
           </a:p>
@@ -879,7 +880,7 @@
           <a:p>
             <a:fld id="{369ECE3D-5579-42B5-BBD4-D71CCDF0049C}" type="datetimeFigureOut">
               <a:rPr lang="en-GB" smtClean="0"/>
-              <a:t>17/10/2022</a:t>
+              <a:t>20/10/2022</a:t>
             </a:fld>
             <a:endParaRPr lang="en-GB"/>
           </a:p>
@@ -1155,7 +1156,7 @@
           <a:p>
             <a:fld id="{369ECE3D-5579-42B5-BBD4-D71CCDF0049C}" type="datetimeFigureOut">
               <a:rPr lang="en-GB" smtClean="0"/>
-              <a:t>17/10/2022</a:t>
+              <a:t>20/10/2022</a:t>
             </a:fld>
             <a:endParaRPr lang="en-GB"/>
           </a:p>
@@ -1423,7 +1424,7 @@
           <a:p>
             <a:fld id="{369ECE3D-5579-42B5-BBD4-D71CCDF0049C}" type="datetimeFigureOut">
               <a:rPr lang="en-GB" smtClean="0"/>
-              <a:t>17/10/2022</a:t>
+              <a:t>20/10/2022</a:t>
             </a:fld>
             <a:endParaRPr lang="en-GB"/>
           </a:p>
@@ -1838,7 +1839,7 @@
           <a:p>
             <a:fld id="{369ECE3D-5579-42B5-BBD4-D71CCDF0049C}" type="datetimeFigureOut">
               <a:rPr lang="en-GB" smtClean="0"/>
-              <a:t>17/10/2022</a:t>
+              <a:t>20/10/2022</a:t>
             </a:fld>
             <a:endParaRPr lang="en-GB"/>
           </a:p>
@@ -1980,7 +1981,7 @@
           <a:p>
             <a:fld id="{369ECE3D-5579-42B5-BBD4-D71CCDF0049C}" type="datetimeFigureOut">
               <a:rPr lang="en-GB" smtClean="0"/>
-              <a:t>17/10/2022</a:t>
+              <a:t>20/10/2022</a:t>
             </a:fld>
             <a:endParaRPr lang="en-GB"/>
           </a:p>
@@ -2093,7 +2094,7 @@
           <a:p>
             <a:fld id="{369ECE3D-5579-42B5-BBD4-D71CCDF0049C}" type="datetimeFigureOut">
               <a:rPr lang="en-GB" smtClean="0"/>
-              <a:t>17/10/2022</a:t>
+              <a:t>20/10/2022</a:t>
             </a:fld>
             <a:endParaRPr lang="en-GB"/>
           </a:p>
@@ -2406,7 +2407,7 @@
           <a:p>
             <a:fld id="{369ECE3D-5579-42B5-BBD4-D71CCDF0049C}" type="datetimeFigureOut">
               <a:rPr lang="en-GB" smtClean="0"/>
-              <a:t>17/10/2022</a:t>
+              <a:t>20/10/2022</a:t>
             </a:fld>
             <a:endParaRPr lang="en-GB"/>
           </a:p>
@@ -2695,7 +2696,7 @@
           <a:p>
             <a:fld id="{369ECE3D-5579-42B5-BBD4-D71CCDF0049C}" type="datetimeFigureOut">
               <a:rPr lang="en-GB" smtClean="0"/>
-              <a:t>17/10/2022</a:t>
+              <a:t>20/10/2022</a:t>
             </a:fld>
             <a:endParaRPr lang="en-GB"/>
           </a:p>
@@ -2938,7 +2939,7 @@
           <a:p>
             <a:fld id="{369ECE3D-5579-42B5-BBD4-D71CCDF0049C}" type="datetimeFigureOut">
               <a:rPr lang="en-GB" smtClean="0"/>
-              <a:t>17/10/2022</a:t>
+              <a:t>20/10/2022</a:t>
             </a:fld>
             <a:endParaRPr lang="en-GB"/>
           </a:p>
@@ -3560,6 +3561,66 @@
 </p:sld>
 </file>
 
+<file path=ppt/slides/slide10.xml><?xml version="1.0" encoding="utf-8"?>
+<p:sld xmlns:a="http://schemas.openxmlformats.org/drawingml/2006/main" xmlns:r="http://schemas.openxmlformats.org/officeDocument/2006/relationships" xmlns:p="http://schemas.openxmlformats.org/presentationml/2006/main">
+  <p:cSld>
+    <p:spTree>
+      <p:nvGrpSpPr>
+        <p:cNvPr id="1" name=""/>
+        <p:cNvGrpSpPr/>
+        <p:nvPr/>
+      </p:nvGrpSpPr>
+      <p:grpSpPr>
+        <a:xfrm>
+          <a:off x="0" y="0"/>
+          <a:ext cx="0" cy="0"/>
+          <a:chOff x="0" y="0"/>
+          <a:chExt cx="0" cy="0"/>
+        </a:xfrm>
+      </p:grpSpPr>
+      <p:pic>
+        <p:nvPicPr>
+          <p:cNvPr id="5" name="Picture 4">
+            <a:extLst>
+              <a:ext uri="{FF2B5EF4-FFF2-40B4-BE49-F238E27FC236}">
+                <a16:creationId xmlns:a16="http://schemas.microsoft.com/office/drawing/2014/main" id="{1E7CAAA5-C5EE-B064-5EE2-7DDF871FDA07}"/>
+              </a:ext>
+            </a:extLst>
+          </p:cNvPr>
+          <p:cNvPicPr>
+            <a:picLocks noChangeAspect="1"/>
+          </p:cNvPicPr>
+          <p:nvPr/>
+        </p:nvPicPr>
+        <p:blipFill>
+          <a:blip r:embed="rId2"/>
+          <a:stretch>
+            <a:fillRect/>
+          </a:stretch>
+        </p:blipFill>
+        <p:spPr>
+          <a:xfrm>
+            <a:off x="0" y="365528"/>
+            <a:ext cx="12192000" cy="6126944"/>
+          </a:xfrm>
+          <a:prstGeom prst="rect">
+            <a:avLst/>
+          </a:prstGeom>
+        </p:spPr>
+      </p:pic>
+    </p:spTree>
+    <p:extLst>
+      <p:ext uri="{BB962C8B-B14F-4D97-AF65-F5344CB8AC3E}">
+        <p14:creationId xmlns:p14="http://schemas.microsoft.com/office/powerpoint/2010/main" val="3560338258"/>
+      </p:ext>
+    </p:extLst>
+  </p:cSld>
+  <p:clrMapOvr>
+    <a:masterClrMapping/>
+  </p:clrMapOvr>
+</p:sld>
+</file>
+
 <file path=ppt/slides/slide2.xml><?xml version="1.0" encoding="utf-8"?>
 <p:sld xmlns:a="http://schemas.openxmlformats.org/drawingml/2006/main" xmlns:r="http://schemas.openxmlformats.org/officeDocument/2006/relationships" xmlns:p="http://schemas.openxmlformats.org/presentationml/2006/main">
   <p:cSld>

</xml_diff>